<commit_message>
code chunk in progress
</commit_message>
<xml_diff>
--- a/module-reproducible-report/img/presentation-work-progress.pptx
+++ b/module-reproducible-report/img/presentation-work-progress.pptx
@@ -8,6 +8,7 @@
     <p:sldId id="256" r:id="rId2"/>
     <p:sldId id="257" r:id="rId3"/>
     <p:sldId id="258" r:id="rId4"/>
+    <p:sldId id="259" r:id="rId5"/>
   </p:sldIdLst>
   <p:sldSz cx="12192000" cy="6858000"/>
   <p:notesSz cx="6858000" cy="9144000"/>
@@ -106,6 +107,11 @@
       </a:defRPr>
     </a:lvl9pPr>
   </p:defaultTextStyle>
+  <p:extLst>
+    <p:ext uri="{EFAFB233-063F-42B5-8137-9DF3F51BA10A}">
+      <p15:sldGuideLst xmlns:p15="http://schemas.microsoft.com/office/powerpoint/2012/main"/>
+    </p:ext>
+  </p:extLst>
 </p:presentation>
 </file>
 
@@ -256,7 +262,7 @@
           <a:p>
             <a:fld id="{8D79C213-A8E5-45E5-9568-DE8B7F4735D2}" type="datetimeFigureOut">
               <a:rPr lang="en-US" smtClean="0"/>
-              <a:t>9/20/2024</a:t>
+              <a:t>9/21/2024</a:t>
             </a:fld>
             <a:endParaRPr lang="en-US"/>
           </a:p>
@@ -454,7 +460,7 @@
           <a:p>
             <a:fld id="{8D79C213-A8E5-45E5-9568-DE8B7F4735D2}" type="datetimeFigureOut">
               <a:rPr lang="en-US" smtClean="0"/>
-              <a:t>9/20/2024</a:t>
+              <a:t>9/21/2024</a:t>
             </a:fld>
             <a:endParaRPr lang="en-US"/>
           </a:p>
@@ -662,7 +668,7 @@
           <a:p>
             <a:fld id="{8D79C213-A8E5-45E5-9568-DE8B7F4735D2}" type="datetimeFigureOut">
               <a:rPr lang="en-US" smtClean="0"/>
-              <a:t>9/20/2024</a:t>
+              <a:t>9/21/2024</a:t>
             </a:fld>
             <a:endParaRPr lang="en-US"/>
           </a:p>
@@ -860,7 +866,7 @@
           <a:p>
             <a:fld id="{8D79C213-A8E5-45E5-9568-DE8B7F4735D2}" type="datetimeFigureOut">
               <a:rPr lang="en-US" smtClean="0"/>
-              <a:t>9/20/2024</a:t>
+              <a:t>9/21/2024</a:t>
             </a:fld>
             <a:endParaRPr lang="en-US"/>
           </a:p>
@@ -1135,7 +1141,7 @@
           <a:p>
             <a:fld id="{8D79C213-A8E5-45E5-9568-DE8B7F4735D2}" type="datetimeFigureOut">
               <a:rPr lang="en-US" smtClean="0"/>
-              <a:t>9/20/2024</a:t>
+              <a:t>9/21/2024</a:t>
             </a:fld>
             <a:endParaRPr lang="en-US"/>
           </a:p>
@@ -1400,7 +1406,7 @@
           <a:p>
             <a:fld id="{8D79C213-A8E5-45E5-9568-DE8B7F4735D2}" type="datetimeFigureOut">
               <a:rPr lang="en-US" smtClean="0"/>
-              <a:t>9/20/2024</a:t>
+              <a:t>9/21/2024</a:t>
             </a:fld>
             <a:endParaRPr lang="en-US"/>
           </a:p>
@@ -1812,7 +1818,7 @@
           <a:p>
             <a:fld id="{8D79C213-A8E5-45E5-9568-DE8B7F4735D2}" type="datetimeFigureOut">
               <a:rPr lang="en-US" smtClean="0"/>
-              <a:t>9/20/2024</a:t>
+              <a:t>9/21/2024</a:t>
             </a:fld>
             <a:endParaRPr lang="en-US"/>
           </a:p>
@@ -1953,7 +1959,7 @@
           <a:p>
             <a:fld id="{8D79C213-A8E5-45E5-9568-DE8B7F4735D2}" type="datetimeFigureOut">
               <a:rPr lang="en-US" smtClean="0"/>
-              <a:t>9/20/2024</a:t>
+              <a:t>9/21/2024</a:t>
             </a:fld>
             <a:endParaRPr lang="en-US"/>
           </a:p>
@@ -2066,7 +2072,7 @@
           <a:p>
             <a:fld id="{8D79C213-A8E5-45E5-9568-DE8B7F4735D2}" type="datetimeFigureOut">
               <a:rPr lang="en-US" smtClean="0"/>
-              <a:t>9/20/2024</a:t>
+              <a:t>9/21/2024</a:t>
             </a:fld>
             <a:endParaRPr lang="en-US"/>
           </a:p>
@@ -2377,7 +2383,7 @@
           <a:p>
             <a:fld id="{8D79C213-A8E5-45E5-9568-DE8B7F4735D2}" type="datetimeFigureOut">
               <a:rPr lang="en-US" smtClean="0"/>
-              <a:t>9/20/2024</a:t>
+              <a:t>9/21/2024</a:t>
             </a:fld>
             <a:endParaRPr lang="en-US"/>
           </a:p>
@@ -2665,7 +2671,7 @@
           <a:p>
             <a:fld id="{8D79C213-A8E5-45E5-9568-DE8B7F4735D2}" type="datetimeFigureOut">
               <a:rPr lang="en-US" smtClean="0"/>
-              <a:t>9/20/2024</a:t>
+              <a:t>9/21/2024</a:t>
             </a:fld>
             <a:endParaRPr lang="en-US"/>
           </a:p>
@@ -2906,7 +2912,7 @@
           <a:p>
             <a:fld id="{8D79C213-A8E5-45E5-9568-DE8B7F4735D2}" type="datetimeFigureOut">
               <a:rPr lang="en-US" smtClean="0"/>
-              <a:t>9/20/2024</a:t>
+              <a:t>9/21/2024</a:t>
             </a:fld>
             <a:endParaRPr lang="en-US"/>
           </a:p>
@@ -3929,6 +3935,123 @@
 </p:sld>
 </file>
 
+<file path=ppt/slides/slide4.xml><?xml version="1.0" encoding="utf-8"?>
+<p:sld xmlns:a="http://schemas.openxmlformats.org/drawingml/2006/main" xmlns:r="http://schemas.openxmlformats.org/officeDocument/2006/relationships" xmlns:p="http://schemas.openxmlformats.org/presentationml/2006/main">
+  <p:cSld>
+    <p:spTree>
+      <p:nvGrpSpPr>
+        <p:cNvPr id="1" name=""/>
+        <p:cNvGrpSpPr/>
+        <p:nvPr/>
+      </p:nvGrpSpPr>
+      <p:grpSpPr>
+        <a:xfrm>
+          <a:off x="0" y="0"/>
+          <a:ext cx="0" cy="0"/>
+          <a:chOff x="0" y="0"/>
+          <a:chExt cx="0" cy="0"/>
+        </a:xfrm>
+      </p:grpSpPr>
+      <p:grpSp>
+        <p:nvGrpSpPr>
+          <p:cNvPr id="12" name="Group 11">
+            <a:extLst>
+              <a:ext uri="{FF2B5EF4-FFF2-40B4-BE49-F238E27FC236}">
+                <a16:creationId xmlns:a16="http://schemas.microsoft.com/office/drawing/2014/main" id="{987C18B3-AAAE-6522-D1B2-CC69802C1C32}"/>
+              </a:ext>
+            </a:extLst>
+          </p:cNvPr>
+          <p:cNvGrpSpPr/>
+          <p:nvPr/>
+        </p:nvGrpSpPr>
+        <p:grpSpPr>
+          <a:xfrm>
+            <a:off x="1244556" y="548574"/>
+            <a:ext cx="8868708" cy="5349306"/>
+            <a:chOff x="275292" y="237678"/>
+            <a:chExt cx="10190790" cy="6382642"/>
+          </a:xfrm>
+        </p:grpSpPr>
+        <p:pic>
+          <p:nvPicPr>
+            <p:cNvPr id="9" name="Picture 8">
+              <a:extLst>
+                <a:ext uri="{FF2B5EF4-FFF2-40B4-BE49-F238E27FC236}">
+                  <a16:creationId xmlns:a16="http://schemas.microsoft.com/office/drawing/2014/main" id="{45CE2F30-E7EA-07F0-A7F3-F94AB382F922}"/>
+                </a:ext>
+              </a:extLst>
+            </p:cNvPr>
+            <p:cNvPicPr>
+              <a:picLocks noChangeAspect="1"/>
+            </p:cNvPicPr>
+            <p:nvPr/>
+          </p:nvPicPr>
+          <p:blipFill>
+            <a:blip r:embed="rId2"/>
+            <a:stretch>
+              <a:fillRect/>
+            </a:stretch>
+          </p:blipFill>
+          <p:spPr>
+            <a:xfrm>
+              <a:off x="275292" y="237679"/>
+              <a:ext cx="5172797" cy="6382641"/>
+            </a:xfrm>
+            <a:prstGeom prst="rect">
+              <a:avLst/>
+            </a:prstGeom>
+          </p:spPr>
+        </p:pic>
+        <p:pic>
+          <p:nvPicPr>
+            <p:cNvPr id="11" name="Picture 10">
+              <a:extLst>
+                <a:ext uri="{FF2B5EF4-FFF2-40B4-BE49-F238E27FC236}">
+                  <a16:creationId xmlns:a16="http://schemas.microsoft.com/office/drawing/2014/main" id="{6AFA984D-6D10-EE27-F79E-CA628596D5A3}"/>
+                </a:ext>
+              </a:extLst>
+            </p:cNvPr>
+            <p:cNvPicPr>
+              <a:picLocks noChangeAspect="1"/>
+            </p:cNvPicPr>
+            <p:nvPr/>
+          </p:nvPicPr>
+          <p:blipFill>
+            <a:blip r:embed="rId3"/>
+            <a:srcRect t="527"/>
+            <a:stretch/>
+          </p:blipFill>
+          <p:spPr>
+            <a:xfrm>
+              <a:off x="5903976" y="237678"/>
+              <a:ext cx="4562106" cy="6382641"/>
+            </a:xfrm>
+            <a:prstGeom prst="rect">
+              <a:avLst/>
+            </a:prstGeom>
+            <a:ln>
+              <a:solidFill>
+                <a:schemeClr val="bg1">
+                  <a:lumMod val="75000"/>
+                </a:schemeClr>
+              </a:solidFill>
+            </a:ln>
+          </p:spPr>
+        </p:pic>
+      </p:grpSp>
+    </p:spTree>
+    <p:extLst>
+      <p:ext uri="{BB962C8B-B14F-4D97-AF65-F5344CB8AC3E}">
+        <p14:creationId xmlns:p14="http://schemas.microsoft.com/office/powerpoint/2010/main" val="509653732"/>
+      </p:ext>
+    </p:extLst>
+  </p:cSld>
+  <p:clrMapOvr>
+    <a:masterClrMapping/>
+  </p:clrMapOvr>
+</p:sld>
+</file>
+
 <file path=ppt/theme/theme1.xml><?xml version="1.0" encoding="utf-8"?>
 <a:theme xmlns:a="http://schemas.openxmlformats.org/drawingml/2006/main" name="Office Theme">
   <a:themeElements>

</xml_diff>